<commit_message>
Update multiple reports and slides
</commit_message>
<xml_diff>
--- a/דוחות/מצגות/הצעת פרויקט.pptx
+++ b/דוחות/מצגות/הצעת פרויקט.pptx
@@ -12,14 +12,16 @@
     <p:sldId id="261" r:id="rId6"/>
     <p:sldId id="262" r:id="rId7"/>
     <p:sldId id="270" r:id="rId8"/>
-    <p:sldId id="271" r:id="rId9"/>
-    <p:sldId id="272" r:id="rId10"/>
-    <p:sldId id="273" r:id="rId11"/>
-    <p:sldId id="264" r:id="rId12"/>
-    <p:sldId id="265" r:id="rId13"/>
-    <p:sldId id="266" r:id="rId14"/>
-    <p:sldId id="267" r:id="rId15"/>
-    <p:sldId id="268" r:id="rId16"/>
+    <p:sldId id="264" r:id="rId9"/>
+    <p:sldId id="274" r:id="rId10"/>
+    <p:sldId id="275" r:id="rId11"/>
+    <p:sldId id="265" r:id="rId12"/>
+    <p:sldId id="266" r:id="rId13"/>
+    <p:sldId id="267" r:id="rId14"/>
+    <p:sldId id="271" r:id="rId15"/>
+    <p:sldId id="272" r:id="rId16"/>
+    <p:sldId id="273" r:id="rId17"/>
+    <p:sldId id="268" r:id="rId18"/>
   </p:sldIdLst>
   <p:sldSz cx="12192000" cy="6858000"/>
   <p:notesSz cx="6858000" cy="9144000"/>
@@ -134,13 +136,15 @@
           <p14:sldIdLst>
             <p14:sldId id="262"/>
             <p14:sldId id="270"/>
+            <p14:sldId id="264"/>
+            <p14:sldId id="274"/>
+            <p14:sldId id="275"/>
+            <p14:sldId id="265"/>
+            <p14:sldId id="266"/>
+            <p14:sldId id="267"/>
             <p14:sldId id="271"/>
             <p14:sldId id="272"/>
             <p14:sldId id="273"/>
-            <p14:sldId id="264"/>
-            <p14:sldId id="265"/>
-            <p14:sldId id="266"/>
-            <p14:sldId id="267"/>
             <p14:sldId id="268"/>
           </p14:sldIdLst>
         </p14:section>
@@ -15541,7 +15545,7 @@
           <a:p>
             <a:fld id="{2E5861C8-6E59-4B49-805F-F09502E84273}" type="datetimeFigureOut">
               <a:rPr lang="he-IL" smtClean="0"/>
-              <a:t>כ"ב/טבת/תשפ"ב</a:t>
+              <a:t>כ"ט/טבת/תשפ"ב</a:t>
             </a:fld>
             <a:endParaRPr lang="he-IL"/>
           </a:p>
@@ -15762,7 +15766,7 @@
           <a:p>
             <a:fld id="{2E5861C8-6E59-4B49-805F-F09502E84273}" type="datetimeFigureOut">
               <a:rPr lang="he-IL" smtClean="0"/>
-              <a:t>כ"ב/טבת/תשפ"ב</a:t>
+              <a:t>כ"ט/טבת/תשפ"ב</a:t>
             </a:fld>
             <a:endParaRPr lang="he-IL"/>
           </a:p>
@@ -15942,7 +15946,7 @@
           <a:p>
             <a:fld id="{2E5861C8-6E59-4B49-805F-F09502E84273}" type="datetimeFigureOut">
               <a:rPr lang="he-IL" smtClean="0"/>
-              <a:t>כ"ב/טבת/תשפ"ב</a:t>
+              <a:t>כ"ט/טבת/תשפ"ב</a:t>
             </a:fld>
             <a:endParaRPr lang="he-IL"/>
           </a:p>
@@ -16112,7 +16116,7 @@
           <a:p>
             <a:fld id="{2E5861C8-6E59-4B49-805F-F09502E84273}" type="datetimeFigureOut">
               <a:rPr lang="he-IL" smtClean="0"/>
-              <a:t>כ"ב/טבת/תשפ"ב</a:t>
+              <a:t>כ"ט/טבת/תשפ"ב</a:t>
             </a:fld>
             <a:endParaRPr lang="he-IL"/>
           </a:p>
@@ -16363,7 +16367,7 @@
           <a:p>
             <a:fld id="{2E5861C8-6E59-4B49-805F-F09502E84273}" type="datetimeFigureOut">
               <a:rPr lang="he-IL" smtClean="0"/>
-              <a:t>כ"ב/טבת/תשפ"ב</a:t>
+              <a:t>כ"ט/טבת/תשפ"ב</a:t>
             </a:fld>
             <a:endParaRPr lang="he-IL"/>
           </a:p>
@@ -16686,7 +16690,7 @@
           <a:p>
             <a:fld id="{2E5861C8-6E59-4B49-805F-F09502E84273}" type="datetimeFigureOut">
               <a:rPr lang="he-IL" smtClean="0"/>
-              <a:t>כ"ב/טבת/תשפ"ב</a:t>
+              <a:t>כ"ט/טבת/תשפ"ב</a:t>
             </a:fld>
             <a:endParaRPr lang="he-IL"/>
           </a:p>
@@ -17110,7 +17114,7 @@
           <a:p>
             <a:fld id="{2E5861C8-6E59-4B49-805F-F09502E84273}" type="datetimeFigureOut">
               <a:rPr lang="he-IL" smtClean="0"/>
-              <a:t>כ"ב/טבת/תשפ"ב</a:t>
+              <a:t>כ"ט/טבת/תשפ"ב</a:t>
             </a:fld>
             <a:endParaRPr lang="he-IL"/>
           </a:p>
@@ -17228,7 +17232,7 @@
           <a:p>
             <a:fld id="{2E5861C8-6E59-4B49-805F-F09502E84273}" type="datetimeFigureOut">
               <a:rPr lang="he-IL" smtClean="0"/>
-              <a:t>כ"ב/טבת/תשפ"ב</a:t>
+              <a:t>כ"ט/טבת/תשפ"ב</a:t>
             </a:fld>
             <a:endParaRPr lang="he-IL"/>
           </a:p>
@@ -17323,7 +17327,7 @@
           <a:p>
             <a:fld id="{2E5861C8-6E59-4B49-805F-F09502E84273}" type="datetimeFigureOut">
               <a:rPr lang="he-IL" smtClean="0"/>
-              <a:t>כ"ב/טבת/תשפ"ב</a:t>
+              <a:t>כ"ט/טבת/תשפ"ב</a:t>
             </a:fld>
             <a:endParaRPr lang="he-IL"/>
           </a:p>
@@ -17613,7 +17617,7 @@
           <a:p>
             <a:fld id="{2E5861C8-6E59-4B49-805F-F09502E84273}" type="datetimeFigureOut">
               <a:rPr lang="he-IL" smtClean="0"/>
-              <a:t>כ"ב/טבת/תשפ"ב</a:t>
+              <a:t>כ"ט/טבת/תשפ"ב</a:t>
             </a:fld>
             <a:endParaRPr lang="he-IL"/>
           </a:p>
@@ -17885,7 +17889,7 @@
           <a:p>
             <a:fld id="{2E5861C8-6E59-4B49-805F-F09502E84273}" type="datetimeFigureOut">
               <a:rPr lang="he-IL" smtClean="0"/>
-              <a:t>כ"ב/טבת/תשפ"ב</a:t>
+              <a:t>כ"ט/טבת/תשפ"ב</a:t>
             </a:fld>
             <a:endParaRPr lang="he-IL"/>
           </a:p>
@@ -18139,7 +18143,7 @@
           <a:p>
             <a:fld id="{2E5861C8-6E59-4B49-805F-F09502E84273}" type="datetimeFigureOut">
               <a:rPr lang="he-IL" smtClean="0"/>
-              <a:t>כ"ב/טבת/תשפ"ב</a:t>
+              <a:t>כ"ט/טבת/תשפ"ב</a:t>
             </a:fld>
             <a:endParaRPr lang="he-IL"/>
           </a:p>
@@ -18765,100 +18769,6 @@
 <file path=ppt/slides/slide10.xml><?xml version="1.0" encoding="utf-8"?>
 <p:sld xmlns:a="http://schemas.openxmlformats.org/drawingml/2006/main" xmlns:r="http://schemas.openxmlformats.org/officeDocument/2006/relationships" xmlns:p="http://schemas.openxmlformats.org/presentationml/2006/main">
   <p:cSld>
-    <p:spTree>
-      <p:nvGrpSpPr>
-        <p:cNvPr id="1" name=""/>
-        <p:cNvGrpSpPr/>
-        <p:nvPr/>
-      </p:nvGrpSpPr>
-      <p:grpSpPr>
-        <a:xfrm>
-          <a:off x="0" y="0"/>
-          <a:ext cx="0" cy="0"/>
-          <a:chOff x="0" y="0"/>
-          <a:chExt cx="0" cy="0"/>
-        </a:xfrm>
-      </p:grpSpPr>
-      <p:sp>
-        <p:nvSpPr>
-          <p:cNvPr id="2" name="Title 1">
-            <a:extLst>
-              <a:ext uri="{FF2B5EF4-FFF2-40B4-BE49-F238E27FC236}">
-                <a16:creationId xmlns:a16="http://schemas.microsoft.com/office/drawing/2014/main" id="{E324F535-E61F-4B56-9587-CCC5B0130789}"/>
-              </a:ext>
-            </a:extLst>
-          </p:cNvPr>
-          <p:cNvSpPr>
-            <a:spLocks noGrp="1"/>
-          </p:cNvSpPr>
-          <p:nvPr>
-            <p:ph type="title"/>
-          </p:nvPr>
-        </p:nvSpPr>
-        <p:spPr/>
-        <p:txBody>
-          <a:bodyPr/>
-          <a:lstStyle/>
-          <a:p>
-            <a:pPr algn="ctr"/>
-            <a:r>
-              <a:rPr lang="he-IL" dirty="0"/>
-              <a:t>תכנון עדכני</a:t>
-            </a:r>
-            <a:endParaRPr lang="LID4096" dirty="0"/>
-          </a:p>
-        </p:txBody>
-      </p:sp>
-      <p:sp>
-        <p:nvSpPr>
-          <p:cNvPr id="3" name="Content Placeholder 2">
-            <a:extLst>
-              <a:ext uri="{FF2B5EF4-FFF2-40B4-BE49-F238E27FC236}">
-                <a16:creationId xmlns:a16="http://schemas.microsoft.com/office/drawing/2014/main" id="{821CEB37-B6A7-400E-B7E7-D01B136ADF52}"/>
-              </a:ext>
-            </a:extLst>
-          </p:cNvPr>
-          <p:cNvSpPr>
-            <a:spLocks noGrp="1"/>
-          </p:cNvSpPr>
-          <p:nvPr>
-            <p:ph idx="1"/>
-          </p:nvPr>
-        </p:nvSpPr>
-        <p:spPr/>
-        <p:txBody>
-          <a:bodyPr/>
-          <a:lstStyle/>
-          <a:p>
-            <a:pPr marL="45720" indent="0">
-              <a:buNone/>
-            </a:pPr>
-            <a:endParaRPr lang="he-IL" dirty="0"/>
-          </a:p>
-          <a:p>
-            <a:pPr marL="45720" indent="0">
-              <a:buNone/>
-            </a:pPr>
-            <a:endParaRPr lang="LID4096" dirty="0"/>
-          </a:p>
-        </p:txBody>
-      </p:sp>
-    </p:spTree>
-    <p:extLst>
-      <p:ext uri="{BB962C8B-B14F-4D97-AF65-F5344CB8AC3E}">
-        <p14:creationId xmlns:p14="http://schemas.microsoft.com/office/powerpoint/2010/main" val="2054299624"/>
-      </p:ext>
-    </p:extLst>
-  </p:cSld>
-  <p:clrMapOvr>
-    <a:masterClrMapping/>
-  </p:clrMapOvr>
-</p:sld>
-</file>
-
-<file path=ppt/slides/slide11.xml><?xml version="1.0" encoding="utf-8"?>
-<p:sld xmlns:a="http://schemas.openxmlformats.org/drawingml/2006/main" xmlns:r="http://schemas.openxmlformats.org/officeDocument/2006/relationships" xmlns:p="http://schemas.openxmlformats.org/presentationml/2006/main">
-  <p:cSld>
     <p:bg>
       <p:bgPr>
         <a:solidFill>
@@ -18886,7 +18796,7 @@
           <p:cNvPr id="2" name="Title 1">
             <a:extLst>
               <a:ext uri="{FF2B5EF4-FFF2-40B4-BE49-F238E27FC236}">
-                <a16:creationId xmlns:a16="http://schemas.microsoft.com/office/drawing/2014/main" id="{9DE43603-0887-4492-AF23-DB9492F8DADB}"/>
+                <a16:creationId xmlns:a16="http://schemas.microsoft.com/office/drawing/2014/main" id="{6C8B9385-8123-4F84-9FEC-A3DBF0E0AC7C}"/>
               </a:ext>
             </a:extLst>
           </p:cNvPr>
@@ -18899,7 +18809,7 @@
         </p:nvSpPr>
         <p:spPr>
           <a:xfrm>
-            <a:off x="4719320" y="619760"/>
+            <a:off x="1143000" y="609600"/>
             <a:ext cx="9875520" cy="1356360"/>
           </a:xfrm>
         </p:spPr>
@@ -18909,55 +18819,174 @@
           </a:bodyPr>
           <a:lstStyle/>
           <a:p>
+            <a:pPr algn="r"/>
             <a:r>
-              <a:rPr lang="he-IL" b="1" dirty="0">
-                <a:latin typeface="Arial" panose="020B0604020202020204" pitchFamily="34" charset="0"/>
-                <a:cs typeface="Arial" panose="020B0604020202020204" pitchFamily="34" charset="0"/>
-              </a:rPr>
-              <a:t>תכנון כללי</a:t>
+              <a:rPr lang="he-IL" dirty="0"/>
+              <a:t>קצת על </a:t>
             </a:r>
-            <a:endParaRPr lang="LID4096" b="1" dirty="0">
-              <a:latin typeface="Arial" panose="020B0604020202020204" pitchFamily="34" charset="0"/>
-              <a:cs typeface="Arial" panose="020B0604020202020204" pitchFamily="34" charset="0"/>
-            </a:endParaRPr>
+            <a:r>
+              <a:rPr lang="en-US" dirty="0"/>
+              <a:t>Mirror</a:t>
+            </a:r>
+            <a:endParaRPr lang="LID4096" dirty="0"/>
           </a:p>
         </p:txBody>
       </p:sp>
-      <p:graphicFrame>
-        <p:nvGraphicFramePr>
-          <p:cNvPr id="5" name="Content Placeholder 2">
+      <p:pic>
+        <p:nvPicPr>
+          <p:cNvPr id="5" name="Picture 4" descr="Graphical user interface, application&#10;&#10;Description automatically generated">
             <a:extLst>
               <a:ext uri="{FF2B5EF4-FFF2-40B4-BE49-F238E27FC236}">
-                <a16:creationId xmlns:a16="http://schemas.microsoft.com/office/drawing/2014/main" id="{0D08182D-FE56-4110-BB94-4AF191F54F28}"/>
+                <a16:creationId xmlns:a16="http://schemas.microsoft.com/office/drawing/2014/main" id="{DE021147-72C2-4152-90D5-B2D32EDE8C07}"/>
               </a:ext>
             </a:extLst>
           </p:cNvPr>
-          <p:cNvGraphicFramePr>
-            <a:graphicFrameLocks noGrp="1"/>
-          </p:cNvGraphicFramePr>
+          <p:cNvPicPr>
+            <a:picLocks noChangeAspect="1"/>
+          </p:cNvPicPr>
+          <p:nvPr/>
+        </p:nvPicPr>
+        <p:blipFill rotWithShape="1">
+          <a:blip r:embed="rId2">
+            <a:extLst>
+              <a:ext uri="{28A0092B-C50C-407E-A947-70E740481C1C}">
+                <a14:useLocalDpi xmlns:a14="http://schemas.microsoft.com/office/drawing/2010/main" val="0"/>
+              </a:ext>
+            </a:extLst>
+          </a:blip>
+          <a:srcRect l="38681" r="38559"/>
+          <a:stretch/>
+        </p:blipFill>
+        <p:spPr>
+          <a:xfrm>
+            <a:off x="1071419" y="2093789"/>
+            <a:ext cx="3141772" cy="3519934"/>
+          </a:xfrm>
+          <a:prstGeom prst="rect">
+            <a:avLst/>
+          </a:prstGeom>
+        </p:spPr>
+      </p:pic>
+      <p:sp>
+        <p:nvSpPr>
+          <p:cNvPr id="3" name="Content Placeholder 2">
+            <a:extLst>
+              <a:ext uri="{FF2B5EF4-FFF2-40B4-BE49-F238E27FC236}">
+                <a16:creationId xmlns:a16="http://schemas.microsoft.com/office/drawing/2014/main" id="{9D4A033E-B6E4-4E4C-BEF5-D261785E47A5}"/>
+              </a:ext>
+            </a:extLst>
+          </p:cNvPr>
+          <p:cNvSpPr>
+            <a:spLocks noGrp="1"/>
+          </p:cNvSpPr>
           <p:nvPr>
             <p:ph idx="1"/>
-            <p:extLst>
-              <p:ext uri="{D42A27DB-BD31-4B8C-83A1-F6EECF244321}">
-                <p14:modId xmlns:p14="http://schemas.microsoft.com/office/powerpoint/2010/main" val="2605943479"/>
-              </p:ext>
-            </p:extLst>
           </p:nvPr>
-        </p:nvGraphicFramePr>
-        <p:xfrm>
-          <a:off x="1143000" y="2298530"/>
-          <a:ext cx="9872663" cy="3797470"/>
-        </p:xfrm>
-        <a:graphic>
-          <a:graphicData uri="http://schemas.openxmlformats.org/drawingml/2006/diagram">
-            <dgm:relIds xmlns:dgm="http://schemas.openxmlformats.org/drawingml/2006/diagram" xmlns:r="http://schemas.openxmlformats.org/officeDocument/2006/relationships" r:dm="rId2" r:lo="rId3" r:qs="rId4" r:cs="rId5"/>
-          </a:graphicData>
-        </a:graphic>
-      </p:graphicFrame>
+        </p:nvSpPr>
+        <p:spPr>
+          <a:xfrm>
+            <a:off x="4490977" y="2057400"/>
+            <a:ext cx="6524894" cy="4038600"/>
+          </a:xfrm>
+        </p:spPr>
+        <p:txBody>
+          <a:bodyPr>
+            <a:normAutofit/>
+          </a:bodyPr>
+          <a:lstStyle/>
+          <a:p>
+            <a:pPr marL="45720" indent="0">
+              <a:buNone/>
+            </a:pPr>
+            <a:r>
+              <a:rPr lang="he-IL" b="1" dirty="0"/>
+              <a:t>למה דווקא </a:t>
+            </a:r>
+            <a:r>
+              <a:rPr lang="en-US" b="1" dirty="0"/>
+              <a:t>Mirror</a:t>
+            </a:r>
+            <a:r>
+              <a:rPr lang="he-IL" b="1" dirty="0"/>
+              <a:t> ?</a:t>
+            </a:r>
+            <a:endParaRPr lang="en-US" b="1" dirty="0"/>
+          </a:p>
+          <a:p>
+            <a:r>
+              <a:rPr lang="he-IL" dirty="0"/>
+              <a:t>תמיכה שוטפת (דוקומנטציה</a:t>
+            </a:r>
+            <a:r>
+              <a:rPr lang="en-US" dirty="0"/>
+              <a:t>,</a:t>
+            </a:r>
+            <a:r>
+              <a:rPr lang="he-IL" dirty="0"/>
+              <a:t> באגים</a:t>
+            </a:r>
+            <a:r>
+              <a:rPr lang="en-US" dirty="0"/>
+              <a:t>,</a:t>
+            </a:r>
+            <a:r>
+              <a:rPr lang="he-IL" dirty="0"/>
+              <a:t> </a:t>
+            </a:r>
+            <a:r>
+              <a:rPr lang="he-IL" dirty="0" err="1"/>
+              <a:t>וכו</a:t>
+            </a:r>
+            <a:r>
+              <a:rPr lang="en-US" dirty="0"/>
+              <a:t>'</a:t>
+            </a:r>
+            <a:r>
+              <a:rPr lang="he-IL" dirty="0"/>
+              <a:t>)</a:t>
+            </a:r>
+            <a:endParaRPr lang="en-US" dirty="0"/>
+          </a:p>
+          <a:p>
+            <a:r>
+              <a:rPr lang="he-IL" dirty="0"/>
+              <a:t>תומך בצד שרת וצד לקוח וגם </a:t>
+            </a:r>
+            <a:r>
+              <a:rPr lang="en-US" dirty="0"/>
+              <a:t>P2P</a:t>
+            </a:r>
+          </a:p>
+          <a:p>
+            <a:r>
+              <a:rPr lang="he-IL" dirty="0"/>
+              <a:t>מקל על ההתעסקות עם השכבות הנמוכות של מודל התקשורת</a:t>
+            </a:r>
+          </a:p>
+          <a:p>
+            <a:r>
+              <a:rPr lang="he-IL" dirty="0"/>
+              <a:t>קל לשימוש</a:t>
+            </a:r>
+          </a:p>
+          <a:p>
+            <a:r>
+              <a:rPr lang="he-IL" dirty="0"/>
+              <a:t>תומך עד 480 שחקנים במקביל</a:t>
+            </a:r>
+          </a:p>
+          <a:p>
+            <a:pPr marL="45720" indent="0">
+              <a:buNone/>
+            </a:pPr>
+            <a:endParaRPr lang="LID4096" dirty="0"/>
+          </a:p>
+        </p:txBody>
+      </p:sp>
     </p:spTree>
     <p:extLst>
       <p:ext uri="{BB962C8B-B14F-4D97-AF65-F5344CB8AC3E}">
-        <p14:creationId xmlns:p14="http://schemas.microsoft.com/office/powerpoint/2010/main" val="4132518354"/>
+        <p14:creationId xmlns:p14="http://schemas.microsoft.com/office/powerpoint/2010/main" val="3120973092"/>
       </p:ext>
     </p:extLst>
   </p:cSld>
@@ -18967,7 +18996,7 @@
 </p:sld>
 </file>
 
-<file path=ppt/slides/slide12.xml><?xml version="1.0" encoding="utf-8"?>
+<file path=ppt/slides/slide11.xml><?xml version="1.0" encoding="utf-8"?>
 <p:sld xmlns:a="http://schemas.openxmlformats.org/drawingml/2006/main" xmlns:r="http://schemas.openxmlformats.org/officeDocument/2006/relationships" xmlns:p="http://schemas.openxmlformats.org/presentationml/2006/main">
   <p:cSld>
     <p:bg>
@@ -19131,7 +19160,7 @@
 </p:sld>
 </file>
 
-<file path=ppt/slides/slide13.xml><?xml version="1.0" encoding="utf-8"?>
+<file path=ppt/slides/slide12.xml><?xml version="1.0" encoding="utf-8"?>
 <p:sld xmlns:a="http://schemas.openxmlformats.org/drawingml/2006/main" xmlns:r="http://schemas.openxmlformats.org/officeDocument/2006/relationships" xmlns:p="http://schemas.openxmlformats.org/presentationml/2006/main">
   <p:cSld>
     <p:spTree>
@@ -19487,7 +19516,7 @@
 </p:sld>
 </file>
 
-<file path=ppt/slides/slide14.xml><?xml version="1.0" encoding="utf-8"?>
+<file path=ppt/slides/slide13.xml><?xml version="1.0" encoding="utf-8"?>
 <p:sld xmlns:a="http://schemas.openxmlformats.org/drawingml/2006/main" xmlns:r="http://schemas.openxmlformats.org/officeDocument/2006/relationships" xmlns:p="http://schemas.openxmlformats.org/presentationml/2006/main">
   <p:cSld>
     <p:bg>
@@ -19817,7 +19846,576 @@
 </p:sld>
 </file>
 
+<file path=ppt/slides/slide14.xml><?xml version="1.0" encoding="utf-8"?>
+<p:sld xmlns:a="http://schemas.openxmlformats.org/drawingml/2006/main" xmlns:r="http://schemas.openxmlformats.org/officeDocument/2006/relationships" xmlns:p="http://schemas.openxmlformats.org/presentationml/2006/main">
+  <p:cSld>
+    <p:spTree>
+      <p:nvGrpSpPr>
+        <p:cNvPr id="1" name=""/>
+        <p:cNvGrpSpPr/>
+        <p:nvPr/>
+      </p:nvGrpSpPr>
+      <p:grpSpPr>
+        <a:xfrm>
+          <a:off x="0" y="0"/>
+          <a:ext cx="0" cy="0"/>
+          <a:chOff x="0" y="0"/>
+          <a:chExt cx="0" cy="0"/>
+        </a:xfrm>
+      </p:grpSpPr>
+      <p:sp>
+        <p:nvSpPr>
+          <p:cNvPr id="2" name="Title 1">
+            <a:extLst>
+              <a:ext uri="{FF2B5EF4-FFF2-40B4-BE49-F238E27FC236}">
+                <a16:creationId xmlns:a16="http://schemas.microsoft.com/office/drawing/2014/main" id="{411F1B61-03E2-4EE7-8C78-9099F23AE0E3}"/>
+              </a:ext>
+            </a:extLst>
+          </p:cNvPr>
+          <p:cNvSpPr>
+            <a:spLocks noGrp="1"/>
+          </p:cNvSpPr>
+          <p:nvPr>
+            <p:ph type="title"/>
+          </p:nvPr>
+        </p:nvSpPr>
+        <p:spPr/>
+        <p:txBody>
+          <a:bodyPr/>
+          <a:lstStyle/>
+          <a:p>
+            <a:pPr algn="ctr"/>
+            <a:r>
+              <a:rPr lang="he-IL" dirty="0"/>
+              <a:t>ניתוח בעיות</a:t>
+            </a:r>
+            <a:endParaRPr lang="LID4096" dirty="0"/>
+          </a:p>
+        </p:txBody>
+      </p:sp>
+      <p:sp>
+        <p:nvSpPr>
+          <p:cNvPr id="3" name="Content Placeholder 2">
+            <a:extLst>
+              <a:ext uri="{FF2B5EF4-FFF2-40B4-BE49-F238E27FC236}">
+                <a16:creationId xmlns:a16="http://schemas.microsoft.com/office/drawing/2014/main" id="{B87DBA36-C30E-4D0A-BC56-CEC8D2E4D40A}"/>
+              </a:ext>
+            </a:extLst>
+          </p:cNvPr>
+          <p:cNvSpPr>
+            <a:spLocks noGrp="1"/>
+          </p:cNvSpPr>
+          <p:nvPr>
+            <p:ph idx="1"/>
+          </p:nvPr>
+        </p:nvSpPr>
+        <p:spPr/>
+        <p:txBody>
+          <a:bodyPr>
+            <a:normAutofit fontScale="85000" lnSpcReduction="20000"/>
+          </a:bodyPr>
+          <a:lstStyle/>
+          <a:p>
+            <a:pPr marL="502920" indent="-457200">
+              <a:buFont typeface="+mj-lt"/>
+              <a:buAutoNum type="arabicPeriod"/>
+            </a:pPr>
+            <a:r>
+              <a:rPr lang="he-IL" dirty="0"/>
+              <a:t>מערכת ה-</a:t>
+            </a:r>
+            <a:r>
+              <a:rPr lang="en-US" dirty="0" err="1"/>
+              <a:t>NavMesh</a:t>
+            </a:r>
+            <a:r>
+              <a:rPr lang="he-IL" dirty="0"/>
+              <a:t> (לניתוב הדמויות) יוצרת בעיות שונות שכל הזמן לעקוף נובע מכך שהיא אינה נתמכת רשמית ע"י המנוע </a:t>
+            </a:r>
+            <a:r>
+              <a:rPr lang="en-US" dirty="0"/>
+              <a:t>Unity</a:t>
+            </a:r>
+            <a:r>
+              <a:rPr lang="he-IL" dirty="0"/>
+              <a:t> </a:t>
+            </a:r>
+            <a:r>
+              <a:rPr lang="en-US" dirty="0"/>
+              <a:t>,</a:t>
+            </a:r>
+            <a:r>
+              <a:rPr lang="he-IL" dirty="0"/>
+              <a:t>כמו כן המערכת די כבידה.</a:t>
+            </a:r>
+          </a:p>
+          <a:p>
+            <a:pPr marL="502920" indent="-457200">
+              <a:buFont typeface="+mj-lt"/>
+              <a:buAutoNum type="arabicPeriod"/>
+            </a:pPr>
+            <a:endParaRPr lang="he-IL" dirty="0"/>
+          </a:p>
+          <a:p>
+            <a:pPr marL="502920" indent="-457200">
+              <a:buFont typeface="+mj-lt"/>
+              <a:buAutoNum type="arabicPeriod"/>
+            </a:pPr>
+            <a:r>
+              <a:rPr lang="he-IL" dirty="0"/>
+              <a:t>מורכב לאסוף </a:t>
+            </a:r>
+            <a:r>
+              <a:rPr lang="en-US" dirty="0"/>
+              <a:t>Assets</a:t>
+            </a:r>
+            <a:r>
+              <a:rPr lang="he-IL" dirty="0"/>
+              <a:t> שונים לא כחבילה אחת כך שנוצרת בעיה של חוסר עקביות מבחינת העיצוב</a:t>
+            </a:r>
+            <a:r>
+              <a:rPr lang="en-US" dirty="0"/>
+              <a:t>,</a:t>
+            </a:r>
+            <a:r>
+              <a:rPr lang="he-IL" dirty="0"/>
+              <a:t>הגדלים וסגנון.</a:t>
+            </a:r>
+          </a:p>
+          <a:p>
+            <a:pPr marL="502920" indent="-457200">
+              <a:buFont typeface="+mj-lt"/>
+              <a:buAutoNum type="arabicPeriod"/>
+            </a:pPr>
+            <a:endParaRPr lang="he-IL" dirty="0"/>
+          </a:p>
+          <a:p>
+            <a:pPr marL="502920" indent="-457200">
+              <a:buFont typeface="+mj-lt"/>
+              <a:buAutoNum type="arabicPeriod"/>
+            </a:pPr>
+            <a:r>
+              <a:rPr lang="he-IL" dirty="0"/>
+              <a:t>בעיית איחוד </a:t>
+            </a:r>
+            <a:r>
+              <a:rPr lang="he-IL" dirty="0" err="1"/>
+              <a:t>בגיטאב</a:t>
+            </a:r>
+            <a:r>
+              <a:rPr lang="he-IL" dirty="0"/>
+              <a:t> במקרה של התנגשויות (בא לידי ביטוי ב</a:t>
+            </a:r>
+            <a:r>
+              <a:rPr lang="en-US" dirty="0"/>
+              <a:t>Prefab</a:t>
+            </a:r>
+            <a:r>
+              <a:rPr lang="he-IL" dirty="0"/>
+              <a:t>)</a:t>
+            </a:r>
+          </a:p>
+          <a:p>
+            <a:pPr marL="502920" indent="-457200">
+              <a:buFont typeface="+mj-lt"/>
+              <a:buAutoNum type="arabicPeriod"/>
+            </a:pPr>
+            <a:endParaRPr lang="he-IL" dirty="0"/>
+          </a:p>
+          <a:p>
+            <a:pPr marL="457200" indent="-457200" algn="r" rtl="1">
+              <a:buFont typeface="+mj-lt"/>
+              <a:buAutoNum type="arabicPeriod"/>
+            </a:pPr>
+            <a:r>
+              <a:rPr lang="he-IL" dirty="0"/>
+              <a:t>קשיים עם המנוע בחלוקת הקוד למחלקות שונות</a:t>
+            </a:r>
+          </a:p>
+          <a:p>
+            <a:pPr marL="457200" indent="-457200" algn="r" rtl="1">
+              <a:buFont typeface="+mj-lt"/>
+              <a:buAutoNum type="arabicPeriod"/>
+            </a:pPr>
+            <a:endParaRPr lang="he-IL" dirty="0"/>
+          </a:p>
+          <a:p>
+            <a:pPr marL="457200" indent="-457200" algn="r" rtl="1">
+              <a:buFont typeface="+mj-lt"/>
+              <a:buAutoNum type="arabicPeriod"/>
+            </a:pPr>
+            <a:r>
+              <a:rPr lang="he-IL" dirty="0"/>
+              <a:t>חלוקת תפקידים שגוייה למטלות גדולות מדי שגם חופפות אחת לשנייה.</a:t>
+            </a:r>
+          </a:p>
+          <a:p>
+            <a:pPr marL="0" indent="0" algn="r" rtl="1">
+              <a:buNone/>
+            </a:pPr>
+            <a:endParaRPr lang="he-IL" dirty="0"/>
+          </a:p>
+          <a:p>
+            <a:pPr marL="45720" indent="0">
+              <a:buNone/>
+            </a:pPr>
+            <a:endParaRPr lang="LID4096" dirty="0"/>
+          </a:p>
+        </p:txBody>
+      </p:sp>
+    </p:spTree>
+    <p:extLst>
+      <p:ext uri="{BB962C8B-B14F-4D97-AF65-F5344CB8AC3E}">
+        <p14:creationId xmlns:p14="http://schemas.microsoft.com/office/powerpoint/2010/main" val="2857711333"/>
+      </p:ext>
+    </p:extLst>
+  </p:cSld>
+  <p:clrMapOvr>
+    <a:masterClrMapping/>
+  </p:clrMapOvr>
+</p:sld>
+</file>
+
 <file path=ppt/slides/slide15.xml><?xml version="1.0" encoding="utf-8"?>
+<p:sld xmlns:a="http://schemas.openxmlformats.org/drawingml/2006/main" xmlns:r="http://schemas.openxmlformats.org/officeDocument/2006/relationships" xmlns:p="http://schemas.openxmlformats.org/presentationml/2006/main">
+  <p:cSld>
+    <p:spTree>
+      <p:nvGrpSpPr>
+        <p:cNvPr id="1" name=""/>
+        <p:cNvGrpSpPr/>
+        <p:nvPr/>
+      </p:nvGrpSpPr>
+      <p:grpSpPr>
+        <a:xfrm>
+          <a:off x="0" y="0"/>
+          <a:ext cx="0" cy="0"/>
+          <a:chOff x="0" y="0"/>
+          <a:chExt cx="0" cy="0"/>
+        </a:xfrm>
+      </p:grpSpPr>
+      <p:sp>
+        <p:nvSpPr>
+          <p:cNvPr id="2" name="Title 1">
+            <a:extLst>
+              <a:ext uri="{FF2B5EF4-FFF2-40B4-BE49-F238E27FC236}">
+                <a16:creationId xmlns:a16="http://schemas.microsoft.com/office/drawing/2014/main" id="{E9F3A4BE-3A08-4354-8BB4-F32DF7B4AC39}"/>
+              </a:ext>
+            </a:extLst>
+          </p:cNvPr>
+          <p:cNvSpPr>
+            <a:spLocks noGrp="1"/>
+          </p:cNvSpPr>
+          <p:nvPr>
+            <p:ph type="title"/>
+          </p:nvPr>
+        </p:nvSpPr>
+        <p:spPr/>
+        <p:txBody>
+          <a:bodyPr/>
+          <a:lstStyle/>
+          <a:p>
+            <a:pPr algn="ctr"/>
+            <a:r>
+              <a:rPr lang="he-IL" dirty="0"/>
+              <a:t>פתרונות עדכניים</a:t>
+            </a:r>
+            <a:endParaRPr lang="LID4096" dirty="0"/>
+          </a:p>
+        </p:txBody>
+      </p:sp>
+      <p:sp>
+        <p:nvSpPr>
+          <p:cNvPr id="3" name="Content Placeholder 2">
+            <a:extLst>
+              <a:ext uri="{FF2B5EF4-FFF2-40B4-BE49-F238E27FC236}">
+                <a16:creationId xmlns:a16="http://schemas.microsoft.com/office/drawing/2014/main" id="{E8E5282E-FB11-4D4D-8D93-3D5BB62A1382}"/>
+              </a:ext>
+            </a:extLst>
+          </p:cNvPr>
+          <p:cNvSpPr>
+            <a:spLocks noGrp="1"/>
+          </p:cNvSpPr>
+          <p:nvPr>
+            <p:ph idx="1"/>
+          </p:nvPr>
+        </p:nvSpPr>
+        <p:spPr/>
+        <p:txBody>
+          <a:bodyPr>
+            <a:normAutofit fontScale="85000" lnSpcReduction="20000"/>
+          </a:bodyPr>
+          <a:lstStyle/>
+          <a:p>
+            <a:pPr marL="502920" indent="-457200">
+              <a:buFont typeface="+mj-lt"/>
+              <a:buAutoNum type="arabicPeriod"/>
+            </a:pPr>
+            <a:r>
+              <a:rPr lang="he-IL" dirty="0"/>
+              <a:t>ב-</a:t>
+            </a:r>
+            <a:r>
+              <a:rPr lang="en-US" dirty="0" err="1"/>
+              <a:t>NavMesh</a:t>
+            </a:r>
+            <a:r>
+              <a:rPr lang="he-IL" dirty="0"/>
+              <a:t> אנחנו מתגברים על הבעיות באופן הדרגתי.</a:t>
+            </a:r>
+            <a:r>
+              <a:rPr lang="en-US" dirty="0"/>
+              <a:t> </a:t>
+            </a:r>
+            <a:r>
+              <a:rPr lang="he-IL" dirty="0"/>
+              <a:t>ועל הכובד של המערכת נתגבר בעזרת צמצום הלוח(מבחינת פיקסלים).</a:t>
+            </a:r>
+          </a:p>
+          <a:p>
+            <a:pPr marL="502920" indent="-457200">
+              <a:buFont typeface="+mj-lt"/>
+              <a:buAutoNum type="arabicPeriod"/>
+            </a:pPr>
+            <a:endParaRPr lang="he-IL" dirty="0"/>
+          </a:p>
+          <a:p>
+            <a:pPr marL="502920" indent="-457200">
+              <a:buFont typeface="+mj-lt"/>
+              <a:buAutoNum type="arabicPeriod"/>
+            </a:pPr>
+            <a:r>
+              <a:rPr lang="he-IL" dirty="0"/>
+              <a:t>מבחינת ה</a:t>
+            </a:r>
+            <a:r>
+              <a:rPr lang="en-US" dirty="0"/>
+              <a:t>Assets</a:t>
+            </a:r>
+            <a:r>
+              <a:rPr lang="he-IL" dirty="0"/>
+              <a:t> אנחנו מתמקדים בלמצוא חבילות אחידות . כרגע מצאנו חבילה לייצור דמויות</a:t>
+            </a:r>
+            <a:r>
+              <a:rPr lang="en-US" dirty="0"/>
+              <a:t>,</a:t>
+            </a:r>
+            <a:r>
+              <a:rPr lang="he-IL" dirty="0"/>
+              <a:t> שבעזרתה אנחנו ניצור את כל היחידות שתכננו</a:t>
+            </a:r>
+            <a:r>
+              <a:rPr lang="en-US" dirty="0"/>
+              <a:t>.</a:t>
+            </a:r>
+            <a:endParaRPr lang="he-IL" dirty="0"/>
+          </a:p>
+          <a:p>
+            <a:pPr marL="502920" indent="-457200">
+              <a:buFont typeface="+mj-lt"/>
+              <a:buAutoNum type="arabicPeriod"/>
+            </a:pPr>
+            <a:endParaRPr lang="he-IL" dirty="0"/>
+          </a:p>
+          <a:p>
+            <a:pPr marL="502920" indent="-457200">
+              <a:buFont typeface="+mj-lt"/>
+              <a:buAutoNum type="arabicPeriod"/>
+            </a:pPr>
+            <a:r>
+              <a:rPr lang="he-IL" dirty="0"/>
+              <a:t>בעניין </a:t>
+            </a:r>
+            <a:r>
+              <a:rPr lang="he-IL" dirty="0" err="1"/>
+              <a:t>הגיטאב</a:t>
+            </a:r>
+            <a:r>
+              <a:rPr lang="en-US" dirty="0"/>
+              <a:t>,</a:t>
+            </a:r>
+            <a:r>
+              <a:rPr lang="he-IL" dirty="0"/>
+              <a:t> העבודה נעשית בצורה משותפת בחלק מהדברים החופפים</a:t>
+            </a:r>
+            <a:r>
+              <a:rPr lang="en-US" dirty="0"/>
+              <a:t>,</a:t>
+            </a:r>
+            <a:r>
+              <a:rPr lang="he-IL" dirty="0"/>
+              <a:t> תזמון העלאות ועדכון לעיתים קרובות יותר של ה-</a:t>
+            </a:r>
+            <a:r>
+              <a:rPr lang="en-US" dirty="0"/>
+              <a:t>repository</a:t>
+            </a:r>
+            <a:r>
+              <a:rPr lang="he-IL" dirty="0"/>
+              <a:t>.</a:t>
+            </a:r>
+          </a:p>
+          <a:p>
+            <a:pPr marL="502920" indent="-457200">
+              <a:buFont typeface="+mj-lt"/>
+              <a:buAutoNum type="arabicPeriod"/>
+            </a:pPr>
+            <a:endParaRPr lang="he-IL" dirty="0"/>
+          </a:p>
+          <a:p>
+            <a:pPr marL="502920" indent="-457200">
+              <a:buFont typeface="+mj-lt"/>
+              <a:buAutoNum type="arabicPeriod"/>
+            </a:pPr>
+            <a:r>
+              <a:rPr lang="he-IL" dirty="0"/>
+              <a:t>חלוקת הקוד נעשית באופן פונקציונאלי בהתאם לפעולות הנדרשות עבור אובייקט מסוים.</a:t>
+            </a:r>
+          </a:p>
+          <a:p>
+            <a:pPr marL="502920" indent="-457200">
+              <a:buFont typeface="+mj-lt"/>
+              <a:buAutoNum type="arabicPeriod"/>
+            </a:pPr>
+            <a:endParaRPr lang="he-IL" dirty="0"/>
+          </a:p>
+          <a:p>
+            <a:pPr marL="502920" indent="-457200">
+              <a:buFont typeface="+mj-lt"/>
+              <a:buAutoNum type="arabicPeriod"/>
+            </a:pPr>
+            <a:r>
+              <a:rPr lang="he-IL" dirty="0"/>
+              <a:t>פיצול עבודה בצורה קטנה ומפורטת יותר של הדברים.</a:t>
+            </a:r>
+          </a:p>
+          <a:p>
+            <a:pPr marL="45720" indent="0">
+              <a:buNone/>
+            </a:pPr>
+            <a:endParaRPr lang="he-IL" dirty="0"/>
+          </a:p>
+          <a:p>
+            <a:pPr marL="45720" indent="0">
+              <a:buNone/>
+            </a:pPr>
+            <a:endParaRPr lang="he-IL" dirty="0"/>
+          </a:p>
+          <a:p>
+            <a:pPr marL="45720" indent="0">
+              <a:buNone/>
+            </a:pPr>
+            <a:endParaRPr lang="LID4096" dirty="0"/>
+          </a:p>
+        </p:txBody>
+      </p:sp>
+    </p:spTree>
+    <p:extLst>
+      <p:ext uri="{BB962C8B-B14F-4D97-AF65-F5344CB8AC3E}">
+        <p14:creationId xmlns:p14="http://schemas.microsoft.com/office/powerpoint/2010/main" val="1356618161"/>
+      </p:ext>
+    </p:extLst>
+  </p:cSld>
+  <p:clrMapOvr>
+    <a:masterClrMapping/>
+  </p:clrMapOvr>
+</p:sld>
+</file>
+
+<file path=ppt/slides/slide16.xml><?xml version="1.0" encoding="utf-8"?>
+<p:sld xmlns:a="http://schemas.openxmlformats.org/drawingml/2006/main" xmlns:r="http://schemas.openxmlformats.org/officeDocument/2006/relationships" xmlns:p="http://schemas.openxmlformats.org/presentationml/2006/main">
+  <p:cSld>
+    <p:spTree>
+      <p:nvGrpSpPr>
+        <p:cNvPr id="1" name=""/>
+        <p:cNvGrpSpPr/>
+        <p:nvPr/>
+      </p:nvGrpSpPr>
+      <p:grpSpPr>
+        <a:xfrm>
+          <a:off x="0" y="0"/>
+          <a:ext cx="0" cy="0"/>
+          <a:chOff x="0" y="0"/>
+          <a:chExt cx="0" cy="0"/>
+        </a:xfrm>
+      </p:grpSpPr>
+      <p:sp>
+        <p:nvSpPr>
+          <p:cNvPr id="2" name="Title 1">
+            <a:extLst>
+              <a:ext uri="{FF2B5EF4-FFF2-40B4-BE49-F238E27FC236}">
+                <a16:creationId xmlns:a16="http://schemas.microsoft.com/office/drawing/2014/main" id="{E324F535-E61F-4B56-9587-CCC5B0130789}"/>
+              </a:ext>
+            </a:extLst>
+          </p:cNvPr>
+          <p:cNvSpPr>
+            <a:spLocks noGrp="1"/>
+          </p:cNvSpPr>
+          <p:nvPr>
+            <p:ph type="title"/>
+          </p:nvPr>
+        </p:nvSpPr>
+        <p:spPr/>
+        <p:txBody>
+          <a:bodyPr/>
+          <a:lstStyle/>
+          <a:p>
+            <a:pPr algn="ctr"/>
+            <a:r>
+              <a:rPr lang="he-IL" dirty="0"/>
+              <a:t>תכנון עדכני</a:t>
+            </a:r>
+            <a:endParaRPr lang="LID4096" dirty="0"/>
+          </a:p>
+        </p:txBody>
+      </p:sp>
+      <p:sp>
+        <p:nvSpPr>
+          <p:cNvPr id="3" name="Content Placeholder 2">
+            <a:extLst>
+              <a:ext uri="{FF2B5EF4-FFF2-40B4-BE49-F238E27FC236}">
+                <a16:creationId xmlns:a16="http://schemas.microsoft.com/office/drawing/2014/main" id="{821CEB37-B6A7-400E-B7E7-D01B136ADF52}"/>
+              </a:ext>
+            </a:extLst>
+          </p:cNvPr>
+          <p:cNvSpPr>
+            <a:spLocks noGrp="1"/>
+          </p:cNvSpPr>
+          <p:nvPr>
+            <p:ph idx="1"/>
+          </p:nvPr>
+        </p:nvSpPr>
+        <p:spPr/>
+        <p:txBody>
+          <a:bodyPr/>
+          <a:lstStyle/>
+          <a:p>
+            <a:pPr marL="45720" indent="0">
+              <a:buNone/>
+            </a:pPr>
+            <a:endParaRPr lang="he-IL" dirty="0"/>
+          </a:p>
+          <a:p>
+            <a:pPr marL="45720" indent="0">
+              <a:buNone/>
+            </a:pPr>
+            <a:endParaRPr lang="LID4096" dirty="0"/>
+          </a:p>
+        </p:txBody>
+      </p:sp>
+    </p:spTree>
+    <p:extLst>
+      <p:ext uri="{BB962C8B-B14F-4D97-AF65-F5344CB8AC3E}">
+        <p14:creationId xmlns:p14="http://schemas.microsoft.com/office/powerpoint/2010/main" val="2054299624"/>
+      </p:ext>
+    </p:extLst>
+  </p:cSld>
+  <p:clrMapOvr>
+    <a:masterClrMapping/>
+  </p:clrMapOvr>
+</p:sld>
+</file>
+
+<file path=ppt/slides/slide17.xml><?xml version="1.0" encoding="utf-8"?>
 <p:sld xmlns:a="http://schemas.openxmlformats.org/drawingml/2006/main" xmlns:r="http://schemas.openxmlformats.org/officeDocument/2006/relationships" xmlns:p="http://schemas.openxmlformats.org/presentationml/2006/main">
   <p:cSld>
     <p:bg>
@@ -23016,6 +23614,14 @@
 <file path=ppt/slides/slide8.xml><?xml version="1.0" encoding="utf-8"?>
 <p:sld xmlns:a="http://schemas.openxmlformats.org/drawingml/2006/main" xmlns:r="http://schemas.openxmlformats.org/officeDocument/2006/relationships" xmlns:p="http://schemas.openxmlformats.org/presentationml/2006/main">
   <p:cSld>
+    <p:bg>
+      <p:bgPr>
+        <a:solidFill>
+          <a:schemeClr val="accent1"/>
+        </a:solidFill>
+        <a:effectLst/>
+      </p:bgPr>
+    </p:bg>
     <p:spTree>
       <p:nvGrpSpPr>
         <p:cNvPr id="1" name=""/>
@@ -23035,7 +23641,7 @@
           <p:cNvPr id="2" name="Title 1">
             <a:extLst>
               <a:ext uri="{FF2B5EF4-FFF2-40B4-BE49-F238E27FC236}">
-                <a16:creationId xmlns:a16="http://schemas.microsoft.com/office/drawing/2014/main" id="{411F1B61-03E2-4EE7-8C78-9099F23AE0E3}"/>
+                <a16:creationId xmlns:a16="http://schemas.microsoft.com/office/drawing/2014/main" id="{9DE43603-0887-4492-AF23-DB9492F8DADB}"/>
               </a:ext>
             </a:extLst>
           </p:cNvPr>
@@ -23046,194 +23652,67 @@
             <p:ph type="title"/>
           </p:nvPr>
         </p:nvSpPr>
-        <p:spPr/>
+        <p:spPr>
+          <a:xfrm>
+            <a:off x="4719320" y="619760"/>
+            <a:ext cx="9875520" cy="1356360"/>
+          </a:xfrm>
+        </p:spPr>
         <p:txBody>
-          <a:bodyPr/>
+          <a:bodyPr>
+            <a:normAutofit/>
+          </a:bodyPr>
           <a:lstStyle/>
           <a:p>
-            <a:pPr algn="ctr"/>
             <a:r>
-              <a:rPr lang="he-IL" dirty="0"/>
-              <a:t>ניתוח בעיות</a:t>
+              <a:rPr lang="he-IL" b="1" dirty="0">
+                <a:latin typeface="Arial" panose="020B0604020202020204" pitchFamily="34" charset="0"/>
+                <a:cs typeface="Arial" panose="020B0604020202020204" pitchFamily="34" charset="0"/>
+              </a:rPr>
+              <a:t>תכנון כללי</a:t>
             </a:r>
-            <a:endParaRPr lang="LID4096" dirty="0"/>
+            <a:endParaRPr lang="LID4096" b="1" dirty="0">
+              <a:latin typeface="Arial" panose="020B0604020202020204" pitchFamily="34" charset="0"/>
+              <a:cs typeface="Arial" panose="020B0604020202020204" pitchFamily="34" charset="0"/>
+            </a:endParaRPr>
           </a:p>
         </p:txBody>
       </p:sp>
-      <p:sp>
-        <p:nvSpPr>
-          <p:cNvPr id="3" name="Content Placeholder 2">
+      <p:graphicFrame>
+        <p:nvGraphicFramePr>
+          <p:cNvPr id="5" name="Content Placeholder 2">
             <a:extLst>
               <a:ext uri="{FF2B5EF4-FFF2-40B4-BE49-F238E27FC236}">
-                <a16:creationId xmlns:a16="http://schemas.microsoft.com/office/drawing/2014/main" id="{B87DBA36-C30E-4D0A-BC56-CEC8D2E4D40A}"/>
+                <a16:creationId xmlns:a16="http://schemas.microsoft.com/office/drawing/2014/main" id="{0D08182D-FE56-4110-BB94-4AF191F54F28}"/>
               </a:ext>
             </a:extLst>
           </p:cNvPr>
-          <p:cNvSpPr>
-            <a:spLocks noGrp="1"/>
-          </p:cNvSpPr>
+          <p:cNvGraphicFramePr>
+            <a:graphicFrameLocks noGrp="1"/>
+          </p:cNvGraphicFramePr>
           <p:nvPr>
             <p:ph idx="1"/>
+            <p:extLst>
+              <p:ext uri="{D42A27DB-BD31-4B8C-83A1-F6EECF244321}">
+                <p14:modId xmlns:p14="http://schemas.microsoft.com/office/powerpoint/2010/main" val="2605943479"/>
+              </p:ext>
+            </p:extLst>
           </p:nvPr>
-        </p:nvSpPr>
-        <p:spPr/>
-        <p:txBody>
-          <a:bodyPr>
-            <a:normAutofit fontScale="85000" lnSpcReduction="20000"/>
-          </a:bodyPr>
-          <a:lstStyle/>
-          <a:p>
-            <a:pPr marL="502920" indent="-457200">
-              <a:buFont typeface="+mj-lt"/>
-              <a:buAutoNum type="arabicPeriod"/>
-            </a:pPr>
-            <a:r>
-              <a:rPr lang="he-IL" dirty="0"/>
-              <a:t>מערכת ה-</a:t>
-            </a:r>
-            <a:r>
-              <a:rPr lang="en-US" dirty="0" err="1"/>
-              <a:t>NavMesh</a:t>
-            </a:r>
-            <a:r>
-              <a:rPr lang="he-IL" dirty="0"/>
-              <a:t> (לניתוב הדמויות) יוצרת בעיות שונות שכל הזמן לעקוף נובע מכך שהיא אינה נתמכת רשמית ע"י המנוע </a:t>
-            </a:r>
-            <a:r>
-              <a:rPr lang="en-US" dirty="0"/>
-              <a:t>Unity</a:t>
-            </a:r>
-            <a:r>
-              <a:rPr lang="he-IL" dirty="0"/>
-              <a:t> </a:t>
-            </a:r>
-            <a:r>
-              <a:rPr lang="en-US" dirty="0"/>
-              <a:t>,</a:t>
-            </a:r>
-            <a:r>
-              <a:rPr lang="he-IL" dirty="0"/>
-              <a:t>כמו כן המערכת די כבידה.</a:t>
-            </a:r>
-          </a:p>
-          <a:p>
-            <a:pPr marL="502920" indent="-457200">
-              <a:buFont typeface="+mj-lt"/>
-              <a:buAutoNum type="arabicPeriod"/>
-            </a:pPr>
-            <a:endParaRPr lang="he-IL" dirty="0"/>
-          </a:p>
-          <a:p>
-            <a:pPr marL="502920" indent="-457200">
-              <a:buFont typeface="+mj-lt"/>
-              <a:buAutoNum type="arabicPeriod"/>
-            </a:pPr>
-            <a:r>
-              <a:rPr lang="he-IL" dirty="0"/>
-              <a:t>מורכב לאסוף </a:t>
-            </a:r>
-            <a:r>
-              <a:rPr lang="en-US" dirty="0"/>
-              <a:t>Assets</a:t>
-            </a:r>
-            <a:r>
-              <a:rPr lang="he-IL" dirty="0"/>
-              <a:t> שונים לא כחבילה אחת כך שנוצרת בעיה של חוסר עקביות מבחינת העיצוב</a:t>
-            </a:r>
-            <a:r>
-              <a:rPr lang="en-US" dirty="0"/>
-              <a:t>,</a:t>
-            </a:r>
-            <a:r>
-              <a:rPr lang="he-IL" dirty="0"/>
-              <a:t>הגדלים וסגנון.</a:t>
-            </a:r>
-          </a:p>
-          <a:p>
-            <a:pPr marL="502920" indent="-457200">
-              <a:buFont typeface="+mj-lt"/>
-              <a:buAutoNum type="arabicPeriod"/>
-            </a:pPr>
-            <a:endParaRPr lang="he-IL" dirty="0"/>
-          </a:p>
-          <a:p>
-            <a:pPr marL="502920" indent="-457200">
-              <a:buFont typeface="+mj-lt"/>
-              <a:buAutoNum type="arabicPeriod"/>
-            </a:pPr>
-            <a:r>
-              <a:rPr lang="he-IL" dirty="0"/>
-              <a:t>בעיית איחוד </a:t>
-            </a:r>
-            <a:r>
-              <a:rPr lang="he-IL" dirty="0" err="1"/>
-              <a:t>בגיטאב</a:t>
-            </a:r>
-            <a:r>
-              <a:rPr lang="he-IL" dirty="0"/>
-              <a:t> במקרה של התנגשויות (בא לידי ביטוי ב</a:t>
-            </a:r>
-            <a:r>
-              <a:rPr lang="en-US" dirty="0"/>
-              <a:t>Prefab</a:t>
-            </a:r>
-            <a:r>
-              <a:rPr lang="he-IL" dirty="0"/>
-              <a:t>)</a:t>
-            </a:r>
-          </a:p>
-          <a:p>
-            <a:pPr marL="502920" indent="-457200">
-              <a:buFont typeface="+mj-lt"/>
-              <a:buAutoNum type="arabicPeriod"/>
-            </a:pPr>
-            <a:endParaRPr lang="he-IL" dirty="0"/>
-          </a:p>
-          <a:p>
-            <a:pPr marL="457200" indent="-457200" algn="r" rtl="1">
-              <a:buFont typeface="+mj-lt"/>
-              <a:buAutoNum type="arabicPeriod"/>
-            </a:pPr>
-            <a:r>
-              <a:rPr lang="he-IL" dirty="0"/>
-              <a:t>קשיים עם המנוע בחלוקת הקוד למחלקות שונות</a:t>
-            </a:r>
-          </a:p>
-          <a:p>
-            <a:pPr marL="457200" indent="-457200" algn="r" rtl="1">
-              <a:buFont typeface="+mj-lt"/>
-              <a:buAutoNum type="arabicPeriod"/>
-            </a:pPr>
-            <a:endParaRPr lang="he-IL" dirty="0"/>
-          </a:p>
-          <a:p>
-            <a:pPr marL="457200" indent="-457200" algn="r" rtl="1">
-              <a:buFont typeface="+mj-lt"/>
-              <a:buAutoNum type="arabicPeriod"/>
-            </a:pPr>
-            <a:r>
-              <a:rPr lang="he-IL" dirty="0"/>
-              <a:t>חלוקת תפקידים שגוייה למטלות גדולות מדי שגם חופפות אחת לשנייה.</a:t>
-            </a:r>
-          </a:p>
-          <a:p>
-            <a:pPr marL="0" indent="0" algn="r" rtl="1">
-              <a:buNone/>
-            </a:pPr>
-            <a:endParaRPr lang="he-IL" dirty="0"/>
-          </a:p>
-          <a:p>
-            <a:pPr marL="45720" indent="0">
-              <a:buNone/>
-            </a:pPr>
-            <a:endParaRPr lang="LID4096" dirty="0"/>
-          </a:p>
-        </p:txBody>
-      </p:sp>
+        </p:nvGraphicFramePr>
+        <p:xfrm>
+          <a:off x="1143000" y="2298530"/>
+          <a:ext cx="9872663" cy="3797470"/>
+        </p:xfrm>
+        <a:graphic>
+          <a:graphicData uri="http://schemas.openxmlformats.org/drawingml/2006/diagram">
+            <dgm:relIds xmlns:dgm="http://schemas.openxmlformats.org/drawingml/2006/diagram" xmlns:r="http://schemas.openxmlformats.org/officeDocument/2006/relationships" r:dm="rId2" r:lo="rId3" r:qs="rId4" r:cs="rId5"/>
+          </a:graphicData>
+        </a:graphic>
+      </p:graphicFrame>
     </p:spTree>
     <p:extLst>
       <p:ext uri="{BB962C8B-B14F-4D97-AF65-F5344CB8AC3E}">
-        <p14:creationId xmlns:p14="http://schemas.microsoft.com/office/powerpoint/2010/main" val="2857711333"/>
+        <p14:creationId xmlns:p14="http://schemas.microsoft.com/office/powerpoint/2010/main" val="4132518354"/>
       </p:ext>
     </p:extLst>
   </p:cSld>
@@ -23265,7 +23744,7 @@
           <p:cNvPr id="2" name="Title 1">
             <a:extLst>
               <a:ext uri="{FF2B5EF4-FFF2-40B4-BE49-F238E27FC236}">
-                <a16:creationId xmlns:a16="http://schemas.microsoft.com/office/drawing/2014/main" id="{E9F3A4BE-3A08-4354-8BB4-F32DF7B4AC39}"/>
+                <a16:creationId xmlns:a16="http://schemas.microsoft.com/office/drawing/2014/main" id="{934B3E86-CF56-456B-908A-4017426A63D0}"/>
               </a:ext>
             </a:extLst>
           </p:cNvPr>
@@ -23276,15 +23755,24 @@
             <p:ph type="title"/>
           </p:nvPr>
         </p:nvSpPr>
-        <p:spPr/>
+        <p:spPr>
+          <a:xfrm>
+            <a:off x="1158240" y="328669"/>
+            <a:ext cx="9875520" cy="1356360"/>
+          </a:xfrm>
+        </p:spPr>
         <p:txBody>
           <a:bodyPr/>
           <a:lstStyle/>
           <a:p>
             <a:pPr algn="ctr"/>
             <a:r>
-              <a:rPr lang="he-IL" dirty="0"/>
-              <a:t>פתרונות עדכניים</a:t>
+              <a:rPr lang="he-IL"/>
+              <a:t>קצת על </a:t>
+            </a:r>
+            <a:r>
+              <a:rPr lang="en-US"/>
+              <a:t>Unity</a:t>
             </a:r>
             <a:endParaRPr lang="LID4096" dirty="0"/>
           </a:p>
@@ -23295,7 +23783,7 @@
           <p:cNvPr id="3" name="Content Placeholder 2">
             <a:extLst>
               <a:ext uri="{FF2B5EF4-FFF2-40B4-BE49-F238E27FC236}">
-                <a16:creationId xmlns:a16="http://schemas.microsoft.com/office/drawing/2014/main" id="{E8E5282E-FB11-4D4D-8D93-3D5BB62A1382}"/>
+                <a16:creationId xmlns:a16="http://schemas.microsoft.com/office/drawing/2014/main" id="{49E8D7F8-0C6E-4752-914D-4C2C8EEE2990}"/>
               </a:ext>
             </a:extLst>
           </p:cNvPr>
@@ -23306,179 +23794,187 @@
             <p:ph idx="1"/>
           </p:nvPr>
         </p:nvSpPr>
-        <p:spPr/>
+        <p:spPr>
+          <a:xfrm>
+            <a:off x="1143000" y="1520328"/>
+            <a:ext cx="9906000" cy="5078776"/>
+          </a:xfrm>
+        </p:spPr>
         <p:txBody>
           <a:bodyPr>
-            <a:normAutofit fontScale="85000" lnSpcReduction="20000"/>
+            <a:normAutofit fontScale="92500" lnSpcReduction="10000"/>
           </a:bodyPr>
           <a:lstStyle/>
           <a:p>
-            <a:pPr marL="502920" indent="-457200">
-              <a:buFont typeface="+mj-lt"/>
-              <a:buAutoNum type="arabicPeriod"/>
+            <a:pPr marL="45720" indent="0">
+              <a:buNone/>
             </a:pPr>
             <a:r>
-              <a:rPr lang="he-IL" dirty="0"/>
-              <a:t>ב-</a:t>
+              <a:rPr lang="he-IL" sz="2400" b="1" dirty="0"/>
+              <a:t>למה דווקא </a:t>
             </a:r>
             <a:r>
-              <a:rPr lang="en-US" dirty="0" err="1"/>
-              <a:t>NavMesh</a:t>
+              <a:rPr lang="en-US" sz="2400" b="1" dirty="0"/>
+              <a:t>Unity</a:t>
             </a:r>
             <a:r>
-              <a:rPr lang="he-IL" dirty="0"/>
-              <a:t> אנחנו מתגברים על הבעיות באופן הדרגתי.</a:t>
-            </a:r>
-            <a:r>
-              <a:rPr lang="en-US" dirty="0"/>
-              <a:t> </a:t>
-            </a:r>
-            <a:r>
-              <a:rPr lang="he-IL" dirty="0"/>
-              <a:t>ועל הכובד של המערכת נתגבר בעזרת צמצום הלוח(מבחינת פיקסלים).</a:t>
+              <a:rPr lang="he-IL" sz="2400" b="1" dirty="0"/>
+              <a:t> ?</a:t>
             </a:r>
           </a:p>
           <a:p>
-            <a:pPr marL="502920" indent="-457200">
-              <a:buFont typeface="+mj-lt"/>
-              <a:buAutoNum type="arabicPeriod"/>
-            </a:pPr>
-            <a:endParaRPr lang="he-IL" dirty="0"/>
-          </a:p>
-          <a:p>
-            <a:pPr marL="502920" indent="-457200">
-              <a:buFont typeface="+mj-lt"/>
-              <a:buAutoNum type="arabicPeriod"/>
-            </a:pPr>
             <a:r>
-              <a:rPr lang="he-IL" dirty="0"/>
-              <a:t>מבחינת ה</a:t>
+              <a:rPr lang="he-IL" sz="2400" dirty="0"/>
+              <a:t>תמיכה שוטפת במנוע משחקים (דוקומנטציה</a:t>
             </a:r>
             <a:r>
-              <a:rPr lang="en-US" dirty="0"/>
-              <a:t>Assets</a:t>
-            </a:r>
-            <a:r>
-              <a:rPr lang="he-IL" dirty="0"/>
-              <a:t> אנחנו מתמקדים בלמצוא חבילות אחידות . כרגע מצאנו חבילה לייצור דמויות</a:t>
-            </a:r>
-            <a:r>
-              <a:rPr lang="en-US" dirty="0"/>
+              <a:rPr lang="en-US" sz="2400" dirty="0"/>
               <a:t>,</a:t>
             </a:r>
             <a:r>
-              <a:rPr lang="he-IL" dirty="0"/>
-              <a:t> שבעזרתה אנחנו ניצור את כל היחידות שתכננו</a:t>
+              <a:rPr lang="he-IL" sz="2400" dirty="0"/>
+              <a:t> באגים </a:t>
             </a:r>
             <a:r>
-              <a:rPr lang="en-US" dirty="0"/>
-              <a:t>.</a:t>
-            </a:r>
-            <a:endParaRPr lang="he-IL" dirty="0"/>
-          </a:p>
-          <a:p>
-            <a:pPr marL="502920" indent="-457200">
-              <a:buFont typeface="+mj-lt"/>
-              <a:buAutoNum type="arabicPeriod"/>
-            </a:pPr>
-            <a:endParaRPr lang="he-IL" dirty="0"/>
-          </a:p>
-          <a:p>
-            <a:pPr marL="502920" indent="-457200">
-              <a:buFont typeface="+mj-lt"/>
-              <a:buAutoNum type="arabicPeriod"/>
-            </a:pPr>
-            <a:r>
-              <a:rPr lang="he-IL" dirty="0"/>
-              <a:t>בעניין </a:t>
+              <a:rPr lang="he-IL" sz="2400" dirty="0" err="1"/>
+              <a:t>וכו</a:t>
             </a:r>
             <a:r>
-              <a:rPr lang="he-IL" dirty="0" err="1"/>
-              <a:t>הגיטאב</a:t>
+              <a:rPr lang="en-US" sz="2400" dirty="0"/>
+              <a:t>'</a:t>
             </a:r>
             <a:r>
-              <a:rPr lang="en-US" dirty="0"/>
-              <a:t>,</a:t>
-            </a:r>
-            <a:r>
-              <a:rPr lang="he-IL" dirty="0"/>
-              <a:t> העבודה נעשית בצורה משותפת בחלק מהדברים החופפים</a:t>
-            </a:r>
-            <a:r>
-              <a:rPr lang="en-US" dirty="0"/>
-              <a:t>,</a:t>
-            </a:r>
-            <a:r>
-              <a:rPr lang="he-IL" dirty="0"/>
-              <a:t> תזמון העלאות ועדכון לעיתים קרובות יותר של ה-</a:t>
-            </a:r>
-            <a:r>
-              <a:rPr lang="en-US" dirty="0"/>
-              <a:t>repository</a:t>
-            </a:r>
-            <a:r>
-              <a:rPr lang="he-IL" dirty="0"/>
-              <a:t>.</a:t>
+              <a:rPr lang="he-IL" sz="2400" dirty="0"/>
+              <a:t>)</a:t>
             </a:r>
           </a:p>
           <a:p>
-            <a:pPr marL="502920" indent="-457200">
-              <a:buFont typeface="+mj-lt"/>
-              <a:buAutoNum type="arabicPeriod"/>
-            </a:pPr>
-            <a:endParaRPr lang="he-IL" dirty="0"/>
+            <a:r>
+              <a:rPr lang="he-IL" sz="2400" dirty="0"/>
+              <a:t>מאוד נוח עבור פיתוח משחקים בדו </a:t>
+            </a:r>
+            <a:r>
+              <a:rPr lang="he-IL" sz="2400" dirty="0" err="1"/>
+              <a:t>מימד</a:t>
+            </a:r>
+            <a:r>
+              <a:rPr lang="he-IL" sz="2400" dirty="0"/>
+              <a:t>(</a:t>
+            </a:r>
+            <a:r>
+              <a:rPr lang="en-US" sz="2400" dirty="0">
+                <a:latin typeface="Gisha" panose="020B0502040204020203" pitchFamily="34" charset="-79"/>
+                <a:cs typeface="Gisha" panose="020B0502040204020203" pitchFamily="34" charset="-79"/>
+              </a:rPr>
+              <a:t>2d</a:t>
+            </a:r>
+            <a:r>
+              <a:rPr lang="he-IL" sz="2400" dirty="0"/>
+              <a:t>)</a:t>
+            </a:r>
+            <a:endParaRPr lang="en-US" sz="2400" dirty="0"/>
           </a:p>
           <a:p>
-            <a:pPr marL="502920" indent="-457200">
-              <a:buFont typeface="+mj-lt"/>
-              <a:buAutoNum type="arabicPeriod"/>
-            </a:pPr>
             <a:r>
-              <a:rPr lang="he-IL" dirty="0"/>
-              <a:t>חלוקת הקוד נעשית באופן פונקציונאלי בהתאם לפעולות הנדרשות עבור אובייקט מסוים.</a:t>
+              <a:rPr lang="he-IL" sz="2400" dirty="0"/>
+              <a:t>מגוון אפשרויות רחב למימושים שונים</a:t>
             </a:r>
           </a:p>
           <a:p>
-            <a:pPr marL="502920" indent="-457200">
-              <a:buFont typeface="+mj-lt"/>
-              <a:buAutoNum type="arabicPeriod"/>
-            </a:pPr>
-            <a:endParaRPr lang="he-IL" dirty="0"/>
-          </a:p>
-          <a:p>
-            <a:pPr marL="502920" indent="-457200">
-              <a:buFont typeface="+mj-lt"/>
-              <a:buAutoNum type="arabicPeriod"/>
-            </a:pPr>
             <a:r>
-              <a:rPr lang="he-IL" dirty="0"/>
-              <a:t>פיצול עבודה בצורה קטנה ומפורטת יותר של הדברים.</a:t>
+              <a:rPr lang="he-IL" sz="2400" dirty="0"/>
+              <a:t>מאפשר שליטה טוטלית באובייקטים השונים </a:t>
             </a:r>
           </a:p>
           <a:p>
             <a:pPr marL="45720" indent="0">
               <a:buNone/>
             </a:pPr>
-            <a:endParaRPr lang="he-IL" dirty="0"/>
+            <a:endParaRPr lang="he-IL" sz="2400" dirty="0"/>
           </a:p>
           <a:p>
             <a:pPr marL="45720" indent="0">
               <a:buNone/>
             </a:pPr>
-            <a:endParaRPr lang="he-IL" dirty="0"/>
+            <a:r>
+              <a:rPr lang="he-IL" sz="2400" b="1" dirty="0"/>
+              <a:t>משחקים פופולריים שפותחו ב</a:t>
+            </a:r>
+            <a:r>
+              <a:rPr lang="en-US" sz="2400" b="1" dirty="0"/>
+              <a:t>Unity</a:t>
+            </a:r>
+            <a:r>
+              <a:rPr lang="he-IL" sz="2400" dirty="0"/>
+              <a:t>:</a:t>
+            </a:r>
           </a:p>
           <a:p>
-            <a:pPr marL="45720" indent="0">
-              <a:buNone/>
-            </a:pPr>
-            <a:endParaRPr lang="LID4096" dirty="0"/>
+            <a:r>
+              <a:rPr lang="en-US" sz="2400" dirty="0"/>
+              <a:t>Ori The Blind Forest</a:t>
+            </a:r>
+          </a:p>
+          <a:p>
+            <a:r>
+              <a:rPr lang="en-US" sz="2400" dirty="0"/>
+              <a:t>Temple Run</a:t>
+            </a:r>
+          </a:p>
+          <a:p>
+            <a:r>
+              <a:rPr lang="en-US" sz="2400" dirty="0"/>
+              <a:t>Rust</a:t>
+            </a:r>
+          </a:p>
+          <a:p>
+            <a:r>
+              <a:rPr lang="en-US" sz="2400" dirty="0"/>
+              <a:t>Pillars of Eternity</a:t>
+            </a:r>
           </a:p>
         </p:txBody>
       </p:sp>
+      <p:pic>
+        <p:nvPicPr>
+          <p:cNvPr id="7" name="Picture 6" descr="Logo&#10;&#10;Description automatically generated">
+            <a:extLst>
+              <a:ext uri="{FF2B5EF4-FFF2-40B4-BE49-F238E27FC236}">
+                <a16:creationId xmlns:a16="http://schemas.microsoft.com/office/drawing/2014/main" id="{AFADE50D-5EBC-42B5-8D5E-3C81B1B4D391}"/>
+              </a:ext>
+            </a:extLst>
+          </p:cNvPr>
+          <p:cNvPicPr>
+            <a:picLocks noChangeAspect="1"/>
+          </p:cNvPicPr>
+          <p:nvPr/>
+        </p:nvPicPr>
+        <p:blipFill>
+          <a:blip r:embed="rId2">
+            <a:extLst>
+              <a:ext uri="{28A0092B-C50C-407E-A947-70E740481C1C}">
+                <a14:useLocalDpi xmlns:a14="http://schemas.microsoft.com/office/drawing/2010/main" val="0"/>
+              </a:ext>
+            </a:extLst>
+          </a:blip>
+          <a:stretch>
+            <a:fillRect/>
+          </a:stretch>
+        </p:blipFill>
+        <p:spPr>
+          <a:xfrm>
+            <a:off x="691309" y="4723385"/>
+            <a:ext cx="4705350" cy="1712302"/>
+          </a:xfrm>
+          <a:prstGeom prst="rect">
+            <a:avLst/>
+          </a:prstGeom>
+        </p:spPr>
+      </p:pic>
     </p:spTree>
     <p:extLst>
       <p:ext uri="{BB962C8B-B14F-4D97-AF65-F5344CB8AC3E}">
-        <p14:creationId xmlns:p14="http://schemas.microsoft.com/office/powerpoint/2010/main" val="1356618161"/>
+        <p14:creationId xmlns:p14="http://schemas.microsoft.com/office/powerpoint/2010/main" val="3319016634"/>
       </p:ext>
     </p:extLst>
   </p:cSld>

</xml_diff>